<commit_message>
angefangen was zu schreiben
</commit_message>
<xml_diff>
--- a/presentation/Präsentation1.pptx
+++ b/presentation/Präsentation1.pptx
@@ -1338,6 +1338,13 @@
         </dgm:presLayoutVars>
       </dgm:prSet>
       <dgm:spPr/>
+      <dgm:t>
+        <a:bodyPr/>
+        <a:lstStyle/>
+        <a:p>
+          <a:endParaRPr lang="de-DE"/>
+        </a:p>
+      </dgm:t>
     </dgm:pt>
     <dgm:pt modelId="{345B9379-9D00-4E9A-88A0-9A89A90705D4}" type="pres">
       <dgm:prSet presAssocID="{413350AB-9F93-41E0-8970-40018F35EE75}" presName="descendantText" presStyleLbl="alignAcc1" presStyleIdx="0" presStyleCnt="5">
@@ -1346,6 +1353,13 @@
         </dgm:presLayoutVars>
       </dgm:prSet>
       <dgm:spPr/>
+      <dgm:t>
+        <a:bodyPr/>
+        <a:lstStyle/>
+        <a:p>
+          <a:endParaRPr lang="de-DE"/>
+        </a:p>
+      </dgm:t>
     </dgm:pt>
     <dgm:pt modelId="{F33E56CC-5361-4766-A5DE-F4C0A08E9C58}" type="pres">
       <dgm:prSet presAssocID="{4342373A-4CA9-44C9-AE5D-0295F535E961}" presName="sp" presStyleCnt="0"/>
@@ -1363,6 +1377,13 @@
         </dgm:presLayoutVars>
       </dgm:prSet>
       <dgm:spPr/>
+      <dgm:t>
+        <a:bodyPr/>
+        <a:lstStyle/>
+        <a:p>
+          <a:endParaRPr lang="de-DE"/>
+        </a:p>
+      </dgm:t>
     </dgm:pt>
     <dgm:pt modelId="{5B7B2730-1446-4684-BEFF-3FBDAD6B338F}" type="pres">
       <dgm:prSet presAssocID="{BCFD4DBA-ED5D-494C-8FF1-59E4C902FD9C}" presName="descendantText" presStyleLbl="alignAcc1" presStyleIdx="1" presStyleCnt="5">
@@ -1395,6 +1416,13 @@
         </dgm:presLayoutVars>
       </dgm:prSet>
       <dgm:spPr/>
+      <dgm:t>
+        <a:bodyPr/>
+        <a:lstStyle/>
+        <a:p>
+          <a:endParaRPr lang="de-DE"/>
+        </a:p>
+      </dgm:t>
     </dgm:pt>
     <dgm:pt modelId="{1E11BB37-4ACE-4054-B12B-3C4A8C3C2DE1}" type="pres">
       <dgm:prSet presAssocID="{AC671DB7-A9FD-4672-932A-69B9E15B58DE}" presName="descendantText" presStyleLbl="alignAcc1" presStyleIdx="2" presStyleCnt="5">
@@ -1427,6 +1455,13 @@
         </dgm:presLayoutVars>
       </dgm:prSet>
       <dgm:spPr/>
+      <dgm:t>
+        <a:bodyPr/>
+        <a:lstStyle/>
+        <a:p>
+          <a:endParaRPr lang="de-DE"/>
+        </a:p>
+      </dgm:t>
     </dgm:pt>
     <dgm:pt modelId="{5802484E-802E-4043-8A1D-54A7F465DEB9}" type="pres">
       <dgm:prSet presAssocID="{C37C915D-7028-488B-8229-58693C3F1620}" presName="descendantText" presStyleLbl="alignAcc1" presStyleIdx="3" presStyleCnt="5">
@@ -1459,6 +1494,13 @@
         </dgm:presLayoutVars>
       </dgm:prSet>
       <dgm:spPr/>
+      <dgm:t>
+        <a:bodyPr/>
+        <a:lstStyle/>
+        <a:p>
+          <a:endParaRPr lang="de-DE"/>
+        </a:p>
+      </dgm:t>
     </dgm:pt>
     <dgm:pt modelId="{D532A752-33EF-4B19-87F3-BBFC8B2AEF58}" type="pres">
       <dgm:prSet presAssocID="{B7DE9923-7F86-424A-BB28-0EA2A1F2D607}" presName="descendantText" presStyleLbl="alignAcc1" presStyleIdx="4" presStyleCnt="5">
@@ -1467,30 +1509,37 @@
         </dgm:presLayoutVars>
       </dgm:prSet>
       <dgm:spPr/>
+      <dgm:t>
+        <a:bodyPr/>
+        <a:lstStyle/>
+        <a:p>
+          <a:endParaRPr lang="de-DE"/>
+        </a:p>
+      </dgm:t>
     </dgm:pt>
   </dgm:ptLst>
   <dgm:cxnLst>
+    <dgm:cxn modelId="{924F3FCC-4469-4E8D-81B6-35EB4E71A37E}" srcId="{C37C915D-7028-488B-8229-58693C3F1620}" destId="{EF10002A-AE70-43EB-95FD-01D393D1B149}" srcOrd="0" destOrd="0" parTransId="{5E6D3100-C56F-4DD9-858F-F059F62EF7E9}" sibTransId="{7663D679-0B55-4CD4-BA2E-FED6EF3E874B}"/>
+    <dgm:cxn modelId="{59505865-74A2-4126-8485-D013010EE329}" type="presOf" srcId="{EF10002A-AE70-43EB-95FD-01D393D1B149}" destId="{5802484E-802E-4043-8A1D-54A7F465DEB9}" srcOrd="0" destOrd="0" presId="urn:microsoft.com/office/officeart/2005/8/layout/chevron2"/>
+    <dgm:cxn modelId="{0B6F3640-AF25-4A9B-84AD-3B93F9B386F6}" srcId="{A845F36F-30CC-4199-8E1A-54248063F77F}" destId="{413350AB-9F93-41E0-8970-40018F35EE75}" srcOrd="0" destOrd="0" parTransId="{56425014-3B7D-4F39-B72F-E8FA71C9C4BA}" sibTransId="{4342373A-4CA9-44C9-AE5D-0295F535E961}"/>
+    <dgm:cxn modelId="{FB9011BB-DE27-4F1B-8A47-0E5CA6C51F52}" srcId="{A845F36F-30CC-4199-8E1A-54248063F77F}" destId="{B7DE9923-7F86-424A-BB28-0EA2A1F2D607}" srcOrd="4" destOrd="0" parTransId="{5146309B-2A4F-4C27-8C73-E7E556E74B94}" sibTransId="{10BE0DD1-6920-44CF-A8F5-E414A207AC73}"/>
+    <dgm:cxn modelId="{E25EF656-E91D-4B71-8114-8BB43E720F86}" srcId="{413350AB-9F93-41E0-8970-40018F35EE75}" destId="{6B92CBE7-E902-444D-AE52-E860F2FCD728}" srcOrd="0" destOrd="0" parTransId="{4DE79FA1-C7AF-492E-95C1-FA5893C46F58}" sibTransId="{9D4A27C7-10E3-4CED-904E-F34E4CBCDAD2}"/>
+    <dgm:cxn modelId="{E3945B01-FCFD-45CF-A4D6-A28FB7D47DB7}" srcId="{AC671DB7-A9FD-4672-932A-69B9E15B58DE}" destId="{541B621A-F318-4799-B44C-94D64E982E25}" srcOrd="0" destOrd="0" parTransId="{7DA0A342-8CF4-4644-B2EE-93DF4BDCEA4C}" sibTransId="{6A27DC28-A4FE-42ED-8D14-ECAE6A671CE0}"/>
+    <dgm:cxn modelId="{BFE40FE6-5E01-488B-A872-FC83461B7C0A}" srcId="{B7DE9923-7F86-424A-BB28-0EA2A1F2D607}" destId="{6B8236A5-3549-4C03-8FDB-CDAE0B620C58}" srcOrd="0" destOrd="0" parTransId="{C18CD82F-E98B-45AF-8393-E1FFC9C20443}" sibTransId="{D7936AEE-5466-42F9-A8C3-9FAAB478F0F5}"/>
+    <dgm:cxn modelId="{35F7A427-4C95-4B31-A286-302FDD142FF0}" type="presOf" srcId="{A845F36F-30CC-4199-8E1A-54248063F77F}" destId="{9B86C69D-6A6C-436C-BB0E-E3CD192C9631}" srcOrd="0" destOrd="0" presId="urn:microsoft.com/office/officeart/2005/8/layout/chevron2"/>
+    <dgm:cxn modelId="{F715B01A-5C04-4447-990A-EB6CEAAECFB3}" srcId="{A845F36F-30CC-4199-8E1A-54248063F77F}" destId="{AC671DB7-A9FD-4672-932A-69B9E15B58DE}" srcOrd="2" destOrd="0" parTransId="{3D220C18-1CB4-40BE-AEF1-89D4E102711E}" sibTransId="{5F830E5E-FA51-4251-86BA-7F256313EEA7}"/>
+    <dgm:cxn modelId="{1ABB9F0B-0C01-4C23-B446-C7EBAA83C03B}" type="presOf" srcId="{413350AB-9F93-41E0-8970-40018F35EE75}" destId="{1334A13D-F0E4-4DE2-8A9E-AFAB9739D856}" srcOrd="0" destOrd="0" presId="urn:microsoft.com/office/officeart/2005/8/layout/chevron2"/>
+    <dgm:cxn modelId="{D277E939-9CB6-4A71-B842-012727EC49BC}" type="presOf" srcId="{6B92CBE7-E902-444D-AE52-E860F2FCD728}" destId="{345B9379-9D00-4E9A-88A0-9A89A90705D4}" srcOrd="0" destOrd="0" presId="urn:microsoft.com/office/officeart/2005/8/layout/chevron2"/>
+    <dgm:cxn modelId="{F0869BAC-565C-4D45-A16A-9861C6E6D191}" srcId="{BCFD4DBA-ED5D-494C-8FF1-59E4C902FD9C}" destId="{C654C476-F2BC-4F28-A196-F009235CD57C}" srcOrd="0" destOrd="0" parTransId="{522EB042-FE23-4E62-8615-EEDC33755027}" sibTransId="{76E23FF4-9F31-41EE-9CB3-670015BB8A83}"/>
+    <dgm:cxn modelId="{CD4DD00C-EDE9-4874-BFF5-BE6179EE2BDB}" type="presOf" srcId="{C37C915D-7028-488B-8229-58693C3F1620}" destId="{30F5BBE5-D1A3-4709-899F-FD47840A8E3C}" srcOrd="0" destOrd="0" presId="urn:microsoft.com/office/officeart/2005/8/layout/chevron2"/>
+    <dgm:cxn modelId="{5CA89E96-E248-4A3D-A102-79743578314D}" srcId="{A845F36F-30CC-4199-8E1A-54248063F77F}" destId="{BCFD4DBA-ED5D-494C-8FF1-59E4C902FD9C}" srcOrd="1" destOrd="0" parTransId="{D4513B5B-94ED-4D11-BC47-4E3E64D98443}" sibTransId="{D6388B87-C3A7-4CD8-AB3A-64852C3E9322}"/>
+    <dgm:cxn modelId="{55EADAD0-4AE6-4EA2-ACC4-3695A5EDDE52}" type="presOf" srcId="{BCFD4DBA-ED5D-494C-8FF1-59E4C902FD9C}" destId="{AE6372F7-3A8A-4D6C-96A6-F6C12593CB6B}" srcOrd="0" destOrd="0" presId="urn:microsoft.com/office/officeart/2005/8/layout/chevron2"/>
+    <dgm:cxn modelId="{17D44CA2-33E2-4464-B88D-8471806CFAF9}" type="presOf" srcId="{C654C476-F2BC-4F28-A196-F009235CD57C}" destId="{5B7B2730-1446-4684-BEFF-3FBDAD6B338F}" srcOrd="0" destOrd="0" presId="urn:microsoft.com/office/officeart/2005/8/layout/chevron2"/>
+    <dgm:cxn modelId="{393133DC-A419-4655-8DC2-65ABB260B134}" type="presOf" srcId="{541B621A-F318-4799-B44C-94D64E982E25}" destId="{1E11BB37-4ACE-4054-B12B-3C4A8C3C2DE1}" srcOrd="0" destOrd="0" presId="urn:microsoft.com/office/officeart/2005/8/layout/chevron2"/>
+    <dgm:cxn modelId="{6EA316DC-0907-4EB9-B148-134AF127C9F9}" type="presOf" srcId="{6B8236A5-3549-4C03-8FDB-CDAE0B620C58}" destId="{D532A752-33EF-4B19-87F3-BBFC8B2AEF58}" srcOrd="0" destOrd="0" presId="urn:microsoft.com/office/officeart/2005/8/layout/chevron2"/>
     <dgm:cxn modelId="{F2C20B38-0CDB-4C8D-8FB1-89779046A150}" type="presOf" srcId="{AC671DB7-A9FD-4672-932A-69B9E15B58DE}" destId="{5B19FEF8-CAC6-4574-A67E-C952F588D0D2}" srcOrd="0" destOrd="0" presId="urn:microsoft.com/office/officeart/2005/8/layout/chevron2"/>
-    <dgm:cxn modelId="{59505865-74A2-4126-8485-D013010EE329}" type="presOf" srcId="{EF10002A-AE70-43EB-95FD-01D393D1B149}" destId="{5802484E-802E-4043-8A1D-54A7F465DEB9}" srcOrd="0" destOrd="0" presId="urn:microsoft.com/office/officeart/2005/8/layout/chevron2"/>
-    <dgm:cxn modelId="{BFE40FE6-5E01-488B-A872-FC83461B7C0A}" srcId="{B7DE9923-7F86-424A-BB28-0EA2A1F2D607}" destId="{6B8236A5-3549-4C03-8FDB-CDAE0B620C58}" srcOrd="0" destOrd="0" parTransId="{C18CD82F-E98B-45AF-8393-E1FFC9C20443}" sibTransId="{D7936AEE-5466-42F9-A8C3-9FAAB478F0F5}"/>
-    <dgm:cxn modelId="{F715B01A-5C04-4447-990A-EB6CEAAECFB3}" srcId="{A845F36F-30CC-4199-8E1A-54248063F77F}" destId="{AC671DB7-A9FD-4672-932A-69B9E15B58DE}" srcOrd="2" destOrd="0" parTransId="{3D220C18-1CB4-40BE-AEF1-89D4E102711E}" sibTransId="{5F830E5E-FA51-4251-86BA-7F256313EEA7}"/>
-    <dgm:cxn modelId="{FB9011BB-DE27-4F1B-8A47-0E5CA6C51F52}" srcId="{A845F36F-30CC-4199-8E1A-54248063F77F}" destId="{B7DE9923-7F86-424A-BB28-0EA2A1F2D607}" srcOrd="4" destOrd="0" parTransId="{5146309B-2A4F-4C27-8C73-E7E556E74B94}" sibTransId="{10BE0DD1-6920-44CF-A8F5-E414A207AC73}"/>
-    <dgm:cxn modelId="{5CA89E96-E248-4A3D-A102-79743578314D}" srcId="{A845F36F-30CC-4199-8E1A-54248063F77F}" destId="{BCFD4DBA-ED5D-494C-8FF1-59E4C902FD9C}" srcOrd="1" destOrd="0" parTransId="{D4513B5B-94ED-4D11-BC47-4E3E64D98443}" sibTransId="{D6388B87-C3A7-4CD8-AB3A-64852C3E9322}"/>
-    <dgm:cxn modelId="{393133DC-A419-4655-8DC2-65ABB260B134}" type="presOf" srcId="{541B621A-F318-4799-B44C-94D64E982E25}" destId="{1E11BB37-4ACE-4054-B12B-3C4A8C3C2DE1}" srcOrd="0" destOrd="0" presId="urn:microsoft.com/office/officeart/2005/8/layout/chevron2"/>
-    <dgm:cxn modelId="{0B6F3640-AF25-4A9B-84AD-3B93F9B386F6}" srcId="{A845F36F-30CC-4199-8E1A-54248063F77F}" destId="{413350AB-9F93-41E0-8970-40018F35EE75}" srcOrd="0" destOrd="0" parTransId="{56425014-3B7D-4F39-B72F-E8FA71C9C4BA}" sibTransId="{4342373A-4CA9-44C9-AE5D-0295F535E961}"/>
-    <dgm:cxn modelId="{55EADAD0-4AE6-4EA2-ACC4-3695A5EDDE52}" type="presOf" srcId="{BCFD4DBA-ED5D-494C-8FF1-59E4C902FD9C}" destId="{AE6372F7-3A8A-4D6C-96A6-F6C12593CB6B}" srcOrd="0" destOrd="0" presId="urn:microsoft.com/office/officeart/2005/8/layout/chevron2"/>
-    <dgm:cxn modelId="{1ABB9F0B-0C01-4C23-B446-C7EBAA83C03B}" type="presOf" srcId="{413350AB-9F93-41E0-8970-40018F35EE75}" destId="{1334A13D-F0E4-4DE2-8A9E-AFAB9739D856}" srcOrd="0" destOrd="0" presId="urn:microsoft.com/office/officeart/2005/8/layout/chevron2"/>
-    <dgm:cxn modelId="{35F7A427-4C95-4B31-A286-302FDD142FF0}" type="presOf" srcId="{A845F36F-30CC-4199-8E1A-54248063F77F}" destId="{9B86C69D-6A6C-436C-BB0E-E3CD192C9631}" srcOrd="0" destOrd="0" presId="urn:microsoft.com/office/officeart/2005/8/layout/chevron2"/>
-    <dgm:cxn modelId="{E3945B01-FCFD-45CF-A4D6-A28FB7D47DB7}" srcId="{AC671DB7-A9FD-4672-932A-69B9E15B58DE}" destId="{541B621A-F318-4799-B44C-94D64E982E25}" srcOrd="0" destOrd="0" parTransId="{7DA0A342-8CF4-4644-B2EE-93DF4BDCEA4C}" sibTransId="{6A27DC28-A4FE-42ED-8D14-ECAE6A671CE0}"/>
     <dgm:cxn modelId="{CD64587A-07C9-42C5-AF64-BF17FD705FBE}" type="presOf" srcId="{B7DE9923-7F86-424A-BB28-0EA2A1F2D607}" destId="{984D793E-AD9F-4B17-B501-63C694295D4E}" srcOrd="0" destOrd="0" presId="urn:microsoft.com/office/officeart/2005/8/layout/chevron2"/>
-    <dgm:cxn modelId="{6EA316DC-0907-4EB9-B148-134AF127C9F9}" type="presOf" srcId="{6B8236A5-3549-4C03-8FDB-CDAE0B620C58}" destId="{D532A752-33EF-4B19-87F3-BBFC8B2AEF58}" srcOrd="0" destOrd="0" presId="urn:microsoft.com/office/officeart/2005/8/layout/chevron2"/>
-    <dgm:cxn modelId="{F0869BAC-565C-4D45-A16A-9861C6E6D191}" srcId="{BCFD4DBA-ED5D-494C-8FF1-59E4C902FD9C}" destId="{C654C476-F2BC-4F28-A196-F009235CD57C}" srcOrd="0" destOrd="0" parTransId="{522EB042-FE23-4E62-8615-EEDC33755027}" sibTransId="{76E23FF4-9F31-41EE-9CB3-670015BB8A83}"/>
-    <dgm:cxn modelId="{924F3FCC-4469-4E8D-81B6-35EB4E71A37E}" srcId="{C37C915D-7028-488B-8229-58693C3F1620}" destId="{EF10002A-AE70-43EB-95FD-01D393D1B149}" srcOrd="0" destOrd="0" parTransId="{5E6D3100-C56F-4DD9-858F-F059F62EF7E9}" sibTransId="{7663D679-0B55-4CD4-BA2E-FED6EF3E874B}"/>
-    <dgm:cxn modelId="{17D44CA2-33E2-4464-B88D-8471806CFAF9}" type="presOf" srcId="{C654C476-F2BC-4F28-A196-F009235CD57C}" destId="{5B7B2730-1446-4684-BEFF-3FBDAD6B338F}" srcOrd="0" destOrd="0" presId="urn:microsoft.com/office/officeart/2005/8/layout/chevron2"/>
-    <dgm:cxn modelId="{CD4DD00C-EDE9-4874-BFF5-BE6179EE2BDB}" type="presOf" srcId="{C37C915D-7028-488B-8229-58693C3F1620}" destId="{30F5BBE5-D1A3-4709-899F-FD47840A8E3C}" srcOrd="0" destOrd="0" presId="urn:microsoft.com/office/officeart/2005/8/layout/chevron2"/>
-    <dgm:cxn modelId="{D277E939-9CB6-4A71-B842-012727EC49BC}" type="presOf" srcId="{6B92CBE7-E902-444D-AE52-E860F2FCD728}" destId="{345B9379-9D00-4E9A-88A0-9A89A90705D4}" srcOrd="0" destOrd="0" presId="urn:microsoft.com/office/officeart/2005/8/layout/chevron2"/>
     <dgm:cxn modelId="{A63358DF-6267-4B60-BBCA-206B169C23EE}" srcId="{A845F36F-30CC-4199-8E1A-54248063F77F}" destId="{C37C915D-7028-488B-8229-58693C3F1620}" srcOrd="3" destOrd="0" parTransId="{B2047586-CFFF-4057-B845-3DDDDC0851C5}" sibTransId="{C429D1C5-E23D-4EAE-8316-F7176599AE3F}"/>
-    <dgm:cxn modelId="{E25EF656-E91D-4B71-8114-8BB43E720F86}" srcId="{413350AB-9F93-41E0-8970-40018F35EE75}" destId="{6B92CBE7-E902-444D-AE52-E860F2FCD728}" srcOrd="0" destOrd="0" parTransId="{4DE79FA1-C7AF-492E-95C1-FA5893C46F58}" sibTransId="{9D4A27C7-10E3-4CED-904E-F34E4CBCDAD2}"/>
     <dgm:cxn modelId="{15BE0397-8E73-46D0-B986-5DF5481A1E55}" type="presParOf" srcId="{9B86C69D-6A6C-436C-BB0E-E3CD192C9631}" destId="{BB437D99-03E5-49F7-AF6C-9C4ECF33DE10}" srcOrd="0" destOrd="0" presId="urn:microsoft.com/office/officeart/2005/8/layout/chevron2"/>
     <dgm:cxn modelId="{1BC6F27F-AA88-4273-A397-73A3B85CA330}" type="presParOf" srcId="{BB437D99-03E5-49F7-AF6C-9C4ECF33DE10}" destId="{1334A13D-F0E4-4DE2-8A9E-AFAB9739D856}" srcOrd="0" destOrd="0" presId="urn:microsoft.com/office/officeart/2005/8/layout/chevron2"/>
     <dgm:cxn modelId="{0BB8A153-FBFB-4647-BECD-517FECB817D2}" type="presParOf" srcId="{BB437D99-03E5-49F7-AF6C-9C4ECF33DE10}" destId="{345B9379-9D00-4E9A-88A0-9A89A90705D4}" srcOrd="1" destOrd="0" presId="urn:microsoft.com/office/officeart/2005/8/layout/chevron2"/>
@@ -3727,7 +3776,7 @@
               <a:pPr>
                 <a:defRPr/>
               </a:pPr>
-              <a:t>12.01.2015</a:t>
+              <a:t>14.01.2015</a:t>
             </a:fld>
             <a:endParaRPr lang="de-DE" dirty="0">
               <a:latin typeface="Lucida Sans Unicode"/>
@@ -3994,7 +4043,7 @@
               <a:pPr>
                 <a:defRPr/>
               </a:pPr>
-              <a:t>12.01.2015</a:t>
+              <a:t>14.01.2015</a:t>
             </a:fld>
             <a:endParaRPr lang="de-DE" dirty="0"/>
           </a:p>
@@ -4406,13 +4455,6 @@
             </a:r>
           </a:p>
           <a:p>
-            <a:endParaRPr lang="de-DE" baseline="0" dirty="0" smtClean="0"/>
-          </a:p>
-          <a:p>
-            <a:r>
-              <a:rPr lang="de-DE" baseline="0" dirty="0" err="1" smtClean="0"/>
-              <a:t>ablauf</a:t>
-            </a:r>
             <a:endParaRPr lang="de-DE" dirty="0" smtClean="0"/>
           </a:p>
         </p:txBody>
@@ -4440,7 +4482,7 @@
               <a:pPr>
                 <a:defRPr/>
               </a:pPr>
-              <a:t>12.01.2015</a:t>
+              <a:t>14.01.2015</a:t>
             </a:fld>
             <a:endParaRPr lang="de-DE" dirty="0"/>
           </a:p>
@@ -4534,7 +4576,13 @@
           <a:p>
             <a:r>
               <a:rPr lang="en-US" dirty="0" smtClean="0"/>
-              <a:t>this is a thesis we already had in the lecture</a:t>
+              <a:t>here we see all samples </a:t>
+            </a:r>
+          </a:p>
+          <a:p>
+            <a:r>
+              <a:rPr lang="en-US" dirty="0" smtClean="0"/>
+              <a:t>and where they were classified</a:t>
             </a:r>
           </a:p>
           <a:p>
@@ -4543,99 +4591,31 @@
           <a:p>
             <a:r>
               <a:rPr lang="en-US" dirty="0" smtClean="0"/>
-              <a:t>but as a small reminder</a:t>
-            </a:r>
+              <a:t>we also see that the classification is result is good because the majority of the sample lie on the diagonal of the matrix</a:t>
+            </a:r>
+          </a:p>
+          <a:p>
+            <a:endParaRPr lang="en-US" dirty="0" smtClean="0"/>
           </a:p>
           <a:p>
             <a:r>
               <a:rPr lang="en-US" dirty="0" smtClean="0"/>
-              <a:t>they assume that every speaker can be assign to one of these animals</a:t>
+              <a:t>on a closer look we see that</a:t>
             </a:r>
           </a:p>
           <a:p>
             <a:r>
               <a:rPr lang="en-US" dirty="0" smtClean="0"/>
-              <a:t>every animal represent a other </a:t>
-            </a:r>
-            <a:r>
-              <a:rPr lang="en-US" dirty="0" err="1" smtClean="0"/>
-              <a:t>charateristic</a:t>
-            </a:r>
+              <a:t>some speaker were much harder to identified as other were almost all sample were right classified</a:t>
+            </a:r>
+          </a:p>
+          <a:p>
+            <a:endParaRPr lang="en-US" dirty="0" smtClean="0"/>
+          </a:p>
+          <a:p>
             <a:r>
               <a:rPr lang="en-US" dirty="0" smtClean="0"/>
-              <a:t> of speaker</a:t>
-            </a:r>
-          </a:p>
-          <a:p>
-            <a:endParaRPr lang="en-US" dirty="0" smtClean="0"/>
-          </a:p>
-          <a:p>
-            <a:r>
-              <a:rPr lang="en-US" dirty="0" smtClean="0"/>
-              <a:t>sheep, 	represent the most speaker</a:t>
-            </a:r>
-          </a:p>
-          <a:p>
-            <a:r>
-              <a:rPr lang="en-US" dirty="0" smtClean="0"/>
-              <a:t>goats, 	where not much samples are right classified, speaker who could not authenticated are goats</a:t>
-            </a:r>
-          </a:p>
-          <a:p>
-            <a:r>
-              <a:rPr lang="en-US" dirty="0" smtClean="0"/>
-              <a:t>lambs, 	where many wrong samples are assign to, need to look on the vertical</a:t>
-            </a:r>
-          </a:p>
-          <a:p>
-            <a:r>
-              <a:rPr lang="en-US" dirty="0" smtClean="0"/>
-              <a:t>wolves,	where a lot of samples are </a:t>
-            </a:r>
-            <a:r>
-              <a:rPr lang="en-US" dirty="0" err="1" smtClean="0"/>
-              <a:t>classifed</a:t>
-            </a:r>
-            <a:r>
-              <a:rPr lang="en-US" dirty="0" smtClean="0"/>
-              <a:t> to few other speaker</a:t>
-            </a:r>
-          </a:p>
-          <a:p>
-            <a:endParaRPr lang="en-US" dirty="0" smtClean="0"/>
-          </a:p>
-          <a:p>
-            <a:r>
-              <a:rPr lang="en-US" dirty="0" smtClean="0"/>
-              <a:t>this categorization we did with all our speaker an come to the conclusion shows in this table </a:t>
-            </a:r>
-          </a:p>
-          <a:p>
-            <a:r>
-              <a:rPr lang="en-US" dirty="0" smtClean="0"/>
-              <a:t>where we can see that the most are </a:t>
-            </a:r>
-            <a:r>
-              <a:rPr lang="en-US" dirty="0" err="1" smtClean="0"/>
-              <a:t>sheeps</a:t>
-            </a:r>
-            <a:r>
-              <a:rPr lang="en-US" dirty="0" smtClean="0"/>
-              <a:t> and </a:t>
-            </a:r>
-            <a:r>
-              <a:rPr lang="en-US" dirty="0" err="1" smtClean="0"/>
-              <a:t>easly</a:t>
-            </a:r>
-            <a:r>
-              <a:rPr lang="en-US" dirty="0" smtClean="0"/>
-              <a:t> to accepted by the system</a:t>
-            </a:r>
-          </a:p>
-          <a:p>
-            <a:r>
-              <a:rPr lang="en-US" dirty="0" smtClean="0"/>
-              <a:t>and only 10% shown this unwanted feature</a:t>
+              <a:t>we come to our last topic</a:t>
             </a:r>
             <a:endParaRPr lang="de-DE" dirty="0"/>
           </a:p>
@@ -4664,7 +4644,7 @@
               <a:pPr>
                 <a:defRPr/>
               </a:pPr>
-              <a:t>12.01.2015</a:t>
+              <a:t>14.01.2015</a:t>
             </a:fld>
             <a:endParaRPr lang="de-DE" dirty="0"/>
           </a:p>
@@ -4693,7 +4673,7 @@
               <a:pPr>
                 <a:defRPr/>
               </a:pPr>
-              <a:t>12</a:t>
+              <a:t>11</a:t>
             </a:fld>
             <a:endParaRPr lang="de-DE" dirty="0"/>
           </a:p>
@@ -4702,7 +4682,7 @@
     </p:spTree>
     <p:extLst>
       <p:ext uri="{BB962C8B-B14F-4D97-AF65-F5344CB8AC3E}">
-        <p14:creationId xmlns:p14="http://schemas.microsoft.com/office/powerpoint/2010/main" val="1404781169"/>
+        <p14:creationId xmlns:p14="http://schemas.microsoft.com/office/powerpoint/2010/main" val="4078180298"/>
       </p:ext>
     </p:extLst>
   </p:cSld>
@@ -4758,57 +4738,108 @@
           <a:p>
             <a:r>
               <a:rPr lang="en-US" dirty="0" smtClean="0"/>
-              <a:t>what did we learn about </a:t>
+              <a:t>this is a thesis we already had in the lecture</a:t>
+            </a:r>
+          </a:p>
+          <a:p>
+            <a:endParaRPr lang="en-US" dirty="0" smtClean="0"/>
+          </a:p>
+          <a:p>
+            <a:r>
+              <a:rPr lang="en-US" dirty="0" smtClean="0"/>
+              <a:t>but as a small reminder</a:t>
+            </a:r>
+          </a:p>
+          <a:p>
+            <a:r>
+              <a:rPr lang="en-US" dirty="0" smtClean="0"/>
+              <a:t>they assume that every speaker can be assign to one of these animals</a:t>
+            </a:r>
+          </a:p>
+          <a:p>
+            <a:r>
+              <a:rPr lang="en-US" dirty="0" smtClean="0"/>
+              <a:t>every animal represent a other </a:t>
             </a:r>
             <a:r>
               <a:rPr lang="en-US" dirty="0" err="1" smtClean="0"/>
-              <a:t>skeaper</a:t>
+              <a:t>charateristic</a:t>
             </a:r>
             <a:r>
               <a:rPr lang="en-US" dirty="0" smtClean="0"/>
-              <a:t> recognition in our project?</a:t>
-            </a:r>
+              <a:t> of speaker</a:t>
+            </a:r>
+          </a:p>
+          <a:p>
+            <a:endParaRPr lang="en-US" dirty="0" smtClean="0"/>
           </a:p>
           <a:p>
             <a:r>
               <a:rPr lang="en-US" dirty="0" smtClean="0"/>
-              <a:t>even with a non optimal database</a:t>
-            </a:r>
-          </a:p>
-          <a:p>
-            <a:r>
-              <a:rPr lang="en-US" b="1" dirty="0" smtClean="0"/>
-              <a:t>but</a:t>
-            </a:r>
+              <a:t>sheep, 	represent the most speaker</a:t>
+            </a:r>
+          </a:p>
+          <a:p>
             <a:r>
               <a:rPr lang="en-US" dirty="0" smtClean="0"/>
-              <a:t> </a:t>
+              <a:t>goats, 	where not much samples are right classified, speaker who could not authenticated are goats</a:t>
             </a:r>
           </a:p>
           <a:p>
             <a:r>
               <a:rPr lang="en-US" dirty="0" smtClean="0"/>
-              <a:t>with the right tools, feature extraction and classification</a:t>
+              <a:t>lambs, 	where many wrong samples are assign to, need to look on the vertical</a:t>
             </a:r>
           </a:p>
           <a:p>
             <a:r>
               <a:rPr lang="en-US" dirty="0" smtClean="0"/>
-              <a:t>We could accomplish </a:t>
-            </a:r>
-          </a:p>
-          <a:p>
+              <a:t>wolves,	where a lot of samples are </a:t>
+            </a:r>
+            <a:r>
+              <a:rPr lang="en-US" dirty="0" err="1" smtClean="0"/>
+              <a:t>classifed</a:t>
+            </a:r>
             <a:r>
               <a:rPr lang="en-US" dirty="0" smtClean="0"/>
-              <a:t>A good result of 97.5% of right </a:t>
+              <a:t> to few other speaker</a:t>
+            </a:r>
+          </a:p>
+          <a:p>
+            <a:endParaRPr lang="en-US" dirty="0" smtClean="0"/>
+          </a:p>
+          <a:p>
+            <a:r>
+              <a:rPr lang="en-US" dirty="0" smtClean="0"/>
+              <a:t>this categorization we did with all our speaker an come to the conclusion shows in this table </a:t>
+            </a:r>
+          </a:p>
+          <a:p>
+            <a:r>
+              <a:rPr lang="en-US" dirty="0" smtClean="0"/>
+              <a:t>where we can see that the most are </a:t>
             </a:r>
             <a:r>
               <a:rPr lang="en-US" dirty="0" err="1" smtClean="0"/>
-              <a:t>authentificated</a:t>
-            </a:r>
-            <a:r>
-              <a:rPr lang="en-US" baseline="0" dirty="0" smtClean="0"/>
-              <a:t> speakers</a:t>
+              <a:t>sheeps</a:t>
+            </a:r>
+            <a:r>
+              <a:rPr lang="en-US" dirty="0" smtClean="0"/>
+              <a:t> and </a:t>
+            </a:r>
+            <a:r>
+              <a:rPr lang="en-US" dirty="0" err="1" smtClean="0"/>
+              <a:t>easly</a:t>
+            </a:r>
+            <a:r>
+              <a:rPr lang="en-US" dirty="0" smtClean="0"/>
+              <a:t> to accepted by the system</a:t>
+            </a:r>
+          </a:p>
+          <a:p>
+            <a:r>
+              <a:rPr lang="en-US" dirty="0" smtClean="0"/>
+              <a:t>and only 10% shown this unwanted feature</a:t>
             </a:r>
             <a:endParaRPr lang="de-DE" dirty="0"/>
           </a:p>
@@ -4837,7 +4868,188 @@
               <a:pPr>
                 <a:defRPr/>
               </a:pPr>
-              <a:t>12.01.2015</a:t>
+              <a:t>14.01.2015</a:t>
+            </a:fld>
+            <a:endParaRPr lang="de-DE" dirty="0"/>
+          </a:p>
+        </p:txBody>
+      </p:sp>
+      <p:sp>
+        <p:nvSpPr>
+          <p:cNvPr id="5" name="Foliennummernplatzhalter 4"/>
+          <p:cNvSpPr>
+            <a:spLocks noGrp="1"/>
+          </p:cNvSpPr>
+          <p:nvPr>
+            <p:ph type="sldNum" sz="quarter" idx="11"/>
+          </p:nvPr>
+        </p:nvSpPr>
+        <p:spPr/>
+        <p:txBody>
+          <a:bodyPr/>
+          <a:lstStyle/>
+          <a:p>
+            <a:pPr>
+              <a:defRPr/>
+            </a:pPr>
+            <a:fld id="{1184DDCB-7D1B-CB4F-980B-B02904018ECE}" type="slidenum">
+              <a:rPr lang="de-DE" smtClean="0"/>
+              <a:pPr>
+                <a:defRPr/>
+              </a:pPr>
+              <a:t>12</a:t>
+            </a:fld>
+            <a:endParaRPr lang="de-DE" dirty="0"/>
+          </a:p>
+        </p:txBody>
+      </p:sp>
+    </p:spTree>
+    <p:extLst>
+      <p:ext uri="{BB962C8B-B14F-4D97-AF65-F5344CB8AC3E}">
+        <p14:creationId xmlns:p14="http://schemas.microsoft.com/office/powerpoint/2010/main" val="1404781169"/>
+      </p:ext>
+    </p:extLst>
+  </p:cSld>
+  <p:clrMapOvr>
+    <a:masterClrMapping/>
+  </p:clrMapOvr>
+</p:notes>
+</file>
+
+<file path=ppt/notesSlides/notesSlide12.xml><?xml version="1.0" encoding="utf-8"?>
+<p:notes xmlns:a="http://schemas.openxmlformats.org/drawingml/2006/main" xmlns:r="http://schemas.openxmlformats.org/officeDocument/2006/relationships" xmlns:p="http://schemas.openxmlformats.org/presentationml/2006/main">
+  <p:cSld>
+    <p:spTree>
+      <p:nvGrpSpPr>
+        <p:cNvPr id="1" name=""/>
+        <p:cNvGrpSpPr/>
+        <p:nvPr/>
+      </p:nvGrpSpPr>
+      <p:grpSpPr>
+        <a:xfrm>
+          <a:off x="0" y="0"/>
+          <a:ext cx="0" cy="0"/>
+          <a:chOff x="0" y="0"/>
+          <a:chExt cx="0" cy="0"/>
+        </a:xfrm>
+      </p:grpSpPr>
+      <p:sp>
+        <p:nvSpPr>
+          <p:cNvPr id="2" name="Folienbildplatzhalter 1"/>
+          <p:cNvSpPr>
+            <a:spLocks noGrp="1" noRot="1" noChangeAspect="1"/>
+          </p:cNvSpPr>
+          <p:nvPr>
+            <p:ph type="sldImg"/>
+          </p:nvPr>
+        </p:nvSpPr>
+        <p:spPr/>
+      </p:sp>
+      <p:sp>
+        <p:nvSpPr>
+          <p:cNvPr id="3" name="Notizenplatzhalter 2"/>
+          <p:cNvSpPr>
+            <a:spLocks noGrp="1"/>
+          </p:cNvSpPr>
+          <p:nvPr>
+            <p:ph type="body" idx="1"/>
+          </p:nvPr>
+        </p:nvSpPr>
+        <p:spPr/>
+        <p:txBody>
+          <a:bodyPr/>
+          <a:lstStyle/>
+          <a:p>
+            <a:r>
+              <a:rPr lang="en-US" dirty="0" smtClean="0"/>
+              <a:t>what did we learn about </a:t>
+            </a:r>
+            <a:r>
+              <a:rPr lang="en-US" dirty="0" err="1" smtClean="0"/>
+              <a:t>skeaper</a:t>
+            </a:r>
+            <a:r>
+              <a:rPr lang="en-US" dirty="0" smtClean="0"/>
+              <a:t> recognition in our project?</a:t>
+            </a:r>
+          </a:p>
+          <a:p>
+            <a:r>
+              <a:rPr lang="en-US" dirty="0" smtClean="0"/>
+              <a:t>even with a non optimal database</a:t>
+            </a:r>
+          </a:p>
+          <a:p>
+            <a:r>
+              <a:rPr lang="en-US" b="1" dirty="0" smtClean="0"/>
+              <a:t>but</a:t>
+            </a:r>
+            <a:r>
+              <a:rPr lang="en-US" dirty="0" smtClean="0"/>
+              <a:t> </a:t>
+            </a:r>
+          </a:p>
+          <a:p>
+            <a:r>
+              <a:rPr lang="en-US" dirty="0" smtClean="0"/>
+              <a:t>with the right tools, feature extraction and classification</a:t>
+            </a:r>
+          </a:p>
+          <a:p>
+            <a:r>
+              <a:rPr lang="en-US" dirty="0" smtClean="0"/>
+              <a:t>We could accomplish </a:t>
+            </a:r>
+          </a:p>
+          <a:p>
+            <a:r>
+              <a:rPr lang="en-US" dirty="0" smtClean="0"/>
+              <a:t>A good result of </a:t>
+            </a:r>
+            <a:r>
+              <a:rPr lang="en-US" dirty="0" smtClean="0"/>
+              <a:t>96.68% </a:t>
+            </a:r>
+            <a:r>
+              <a:rPr lang="en-US" dirty="0" smtClean="0"/>
+              <a:t>of right </a:t>
+            </a:r>
+            <a:r>
+              <a:rPr lang="en-US" dirty="0" err="1" smtClean="0"/>
+              <a:t>authentificated</a:t>
+            </a:r>
+            <a:r>
+              <a:rPr lang="en-US" baseline="0" dirty="0" smtClean="0"/>
+              <a:t> speakers</a:t>
+            </a:r>
+            <a:endParaRPr lang="de-DE" dirty="0"/>
+          </a:p>
+        </p:txBody>
+      </p:sp>
+      <p:sp>
+        <p:nvSpPr>
+          <p:cNvPr id="4" name="Datumsplatzhalter 3"/>
+          <p:cNvSpPr>
+            <a:spLocks noGrp="1"/>
+          </p:cNvSpPr>
+          <p:nvPr>
+            <p:ph type="dt" idx="10"/>
+          </p:nvPr>
+        </p:nvSpPr>
+        <p:spPr/>
+        <p:txBody>
+          <a:bodyPr/>
+          <a:lstStyle/>
+          <a:p>
+            <a:pPr>
+              <a:defRPr/>
+            </a:pPr>
+            <a:fld id="{BB20452E-8883-5147-AA9D-6D93D27285EC}" type="datetime1">
+              <a:rPr lang="de-DE" smtClean="0"/>
+              <a:pPr>
+                <a:defRPr/>
+              </a:pPr>
+              <a:t>14.01.2015</a:t>
             </a:fld>
             <a:endParaRPr lang="de-DE" dirty="0"/>
           </a:p>
@@ -4929,7 +5141,58 @@
           <a:bodyPr/>
           <a:lstStyle/>
           <a:p>
-            <a:endParaRPr lang="de-DE" dirty="0"/>
+            <a:r>
+              <a:rPr lang="de-DE" dirty="0" err="1" smtClean="0"/>
+              <a:t>We</a:t>
+            </a:r>
+            <a:r>
+              <a:rPr lang="de-DE" dirty="0" smtClean="0"/>
+              <a:t> </a:t>
+            </a:r>
+            <a:r>
+              <a:rPr lang="de-DE" dirty="0" err="1" smtClean="0"/>
+              <a:t>used</a:t>
+            </a:r>
+            <a:r>
+              <a:rPr lang="de-DE" dirty="0" smtClean="0"/>
+              <a:t> </a:t>
+            </a:r>
+            <a:r>
+              <a:rPr lang="de-DE" dirty="0" err="1" smtClean="0"/>
+              <a:t>database</a:t>
+            </a:r>
+            <a:endParaRPr lang="de-DE" dirty="0" smtClean="0"/>
+          </a:p>
+          <a:p>
+            <a:r>
+              <a:rPr lang="de-DE" dirty="0" err="1" smtClean="0"/>
+              <a:t>We</a:t>
+            </a:r>
+            <a:r>
+              <a:rPr lang="de-DE" dirty="0" smtClean="0"/>
+              <a:t> </a:t>
+            </a:r>
+            <a:r>
+              <a:rPr lang="de-DE" dirty="0" err="1" smtClean="0"/>
+              <a:t>compared</a:t>
+            </a:r>
+            <a:r>
+              <a:rPr lang="de-DE" dirty="0" smtClean="0"/>
+              <a:t> </a:t>
+            </a:r>
+            <a:r>
+              <a:rPr lang="de-DE" dirty="0" err="1" smtClean="0"/>
+              <a:t>our</a:t>
+            </a:r>
+            <a:r>
+              <a:rPr lang="de-DE" dirty="0" smtClean="0"/>
+              <a:t> </a:t>
+            </a:r>
+            <a:r>
+              <a:rPr lang="de-DE" dirty="0" err="1" smtClean="0"/>
+              <a:t>results</a:t>
+            </a:r>
+            <a:endParaRPr lang="de-DE" dirty="0" smtClean="0"/>
           </a:p>
         </p:txBody>
       </p:sp>
@@ -4956,7 +5219,7 @@
               <a:pPr>
                 <a:defRPr/>
               </a:pPr>
-              <a:t>12.01.2015</a:t>
+              <a:t>14.01.2015</a:t>
             </a:fld>
             <a:endParaRPr lang="de-DE" dirty="0"/>
           </a:p>
@@ -5124,7 +5387,7 @@
               <a:pPr>
                 <a:defRPr/>
               </a:pPr>
-              <a:t>12.01.2015</a:t>
+              <a:t>14.01.2015</a:t>
             </a:fld>
             <a:endParaRPr lang="de-DE" dirty="0"/>
           </a:p>
@@ -5322,7 +5585,7 @@
               <a:pPr>
                 <a:defRPr/>
               </a:pPr>
-              <a:t>12.01.2015</a:t>
+              <a:t>14.01.2015</a:t>
             </a:fld>
             <a:endParaRPr lang="de-DE" dirty="0"/>
           </a:p>
@@ -5465,7 +5728,7 @@
               <a:pPr>
                 <a:defRPr/>
               </a:pPr>
-              <a:t>12.01.2015</a:t>
+              <a:t>14.01.2015</a:t>
             </a:fld>
             <a:endParaRPr lang="de-DE" dirty="0"/>
           </a:p>
@@ -5629,7 +5892,7 @@
               <a:pPr>
                 <a:defRPr/>
               </a:pPr>
-              <a:t>12.01.2015</a:t>
+              <a:t>14.01.2015</a:t>
             </a:fld>
             <a:endParaRPr lang="de-DE" dirty="0"/>
           </a:p>
@@ -5845,7 +6108,7 @@
               <a:pPr>
                 <a:defRPr/>
               </a:pPr>
-              <a:t>12.01.2015</a:t>
+              <a:t>14.01.2015</a:t>
             </a:fld>
             <a:endParaRPr lang="de-DE" dirty="0"/>
           </a:p>
@@ -6480,7 +6743,7 @@
               <a:pPr>
                 <a:defRPr/>
               </a:pPr>
-              <a:t>12.01.2015</a:t>
+              <a:t>14.01.2015</a:t>
             </a:fld>
             <a:endParaRPr lang="de-DE" dirty="0"/>
           </a:p>
@@ -6573,49 +6836,270 @@
           <a:lstStyle/>
           <a:p>
             <a:r>
-              <a:rPr lang="en-US" dirty="0" smtClean="0"/>
-              <a:t>here we see all samples </a:t>
-            </a:r>
-          </a:p>
-          <a:p>
-            <a:r>
-              <a:rPr lang="en-US" dirty="0" smtClean="0"/>
-              <a:t>and where they were classified</a:t>
-            </a:r>
-          </a:p>
-          <a:p>
-            <a:endParaRPr lang="en-US" dirty="0" smtClean="0"/>
-          </a:p>
-          <a:p>
-            <a:r>
-              <a:rPr lang="en-US" dirty="0" smtClean="0"/>
-              <a:t>we also see that the classification is result is good because the majority of the sample lie on the diagonal of the matrix</a:t>
-            </a:r>
-          </a:p>
-          <a:p>
-            <a:endParaRPr lang="en-US" dirty="0" smtClean="0"/>
-          </a:p>
-          <a:p>
-            <a:r>
-              <a:rPr lang="en-US" dirty="0" smtClean="0"/>
-              <a:t>on a closer look we see that</a:t>
-            </a:r>
-          </a:p>
-          <a:p>
-            <a:r>
-              <a:rPr lang="en-US" dirty="0" smtClean="0"/>
-              <a:t>some speaker were much harder to identified as other were almost all sample were right classified</a:t>
-            </a:r>
-          </a:p>
-          <a:p>
-            <a:endParaRPr lang="en-US" dirty="0" smtClean="0"/>
-          </a:p>
-          <a:p>
-            <a:r>
-              <a:rPr lang="en-US" dirty="0" smtClean="0"/>
-              <a:t>we come to our last topic</a:t>
-            </a:r>
-            <a:endParaRPr lang="de-DE" dirty="0"/>
+              <a:rPr lang="de-DE" dirty="0" err="1" smtClean="0"/>
+              <a:t>To</a:t>
+            </a:r>
+            <a:r>
+              <a:rPr lang="de-DE" dirty="0" smtClean="0"/>
+              <a:t> </a:t>
+            </a:r>
+            <a:r>
+              <a:rPr lang="de-DE" dirty="0" err="1" smtClean="0"/>
+              <a:t>explain</a:t>
+            </a:r>
+            <a:r>
+              <a:rPr lang="de-DE" dirty="0" smtClean="0"/>
+              <a:t> </a:t>
+            </a:r>
+            <a:r>
+              <a:rPr lang="de-DE" dirty="0" err="1" smtClean="0"/>
+              <a:t>out</a:t>
+            </a:r>
+            <a:r>
+              <a:rPr lang="de-DE" baseline="0" dirty="0" err="1" smtClean="0"/>
+              <a:t>r</a:t>
+            </a:r>
+            <a:r>
+              <a:rPr lang="de-DE" baseline="0" dirty="0" smtClean="0"/>
+              <a:t> </a:t>
+            </a:r>
+            <a:r>
+              <a:rPr lang="de-DE" baseline="0" dirty="0" err="1" smtClean="0"/>
+              <a:t>result</a:t>
+            </a:r>
+            <a:r>
+              <a:rPr lang="de-DE" baseline="0" dirty="0" smtClean="0"/>
+              <a:t> </a:t>
+            </a:r>
+          </a:p>
+          <a:p>
+            <a:r>
+              <a:rPr lang="de-DE" baseline="0" dirty="0" smtClean="0"/>
+              <a:t>I </a:t>
+            </a:r>
+            <a:r>
+              <a:rPr lang="de-DE" baseline="0" dirty="0" err="1" smtClean="0"/>
+              <a:t>want</a:t>
+            </a:r>
+            <a:r>
+              <a:rPr lang="de-DE" baseline="0" dirty="0" smtClean="0"/>
+              <a:t> </a:t>
+            </a:r>
+            <a:r>
+              <a:rPr lang="de-DE" baseline="0" dirty="0" err="1" smtClean="0"/>
+              <a:t>to</a:t>
+            </a:r>
+            <a:r>
+              <a:rPr lang="de-DE" baseline="0" dirty="0" smtClean="0"/>
+              <a:t> </a:t>
+            </a:r>
+            <a:r>
+              <a:rPr lang="de-DE" baseline="0" dirty="0" err="1" smtClean="0"/>
+              <a:t>draw</a:t>
+            </a:r>
+            <a:r>
+              <a:rPr lang="de-DE" baseline="0" dirty="0" smtClean="0"/>
+              <a:t> </a:t>
+            </a:r>
+            <a:r>
+              <a:rPr lang="de-DE" baseline="0" dirty="0" err="1" smtClean="0"/>
+              <a:t>attention</a:t>
+            </a:r>
+            <a:r>
+              <a:rPr lang="de-DE" baseline="0" dirty="0" smtClean="0"/>
+              <a:t> </a:t>
+            </a:r>
+            <a:r>
+              <a:rPr lang="de-DE" baseline="0" dirty="0" err="1" smtClean="0"/>
+              <a:t>to</a:t>
+            </a:r>
+            <a:r>
+              <a:rPr lang="de-DE" baseline="0" dirty="0" smtClean="0"/>
+              <a:t> </a:t>
+            </a:r>
+            <a:r>
+              <a:rPr lang="de-DE" baseline="0" dirty="0" err="1" smtClean="0"/>
+              <a:t>our</a:t>
+            </a:r>
+            <a:r>
+              <a:rPr lang="de-DE" baseline="0" dirty="0" smtClean="0"/>
+              <a:t> </a:t>
+            </a:r>
+            <a:r>
+              <a:rPr lang="de-DE" baseline="0" dirty="0" err="1" smtClean="0"/>
+              <a:t>task</a:t>
+            </a:r>
+            <a:r>
+              <a:rPr lang="de-DE" baseline="0" dirty="0" smtClean="0"/>
+              <a:t> </a:t>
+            </a:r>
+            <a:r>
+              <a:rPr lang="de-DE" baseline="0" dirty="0" err="1" smtClean="0"/>
+              <a:t>of</a:t>
+            </a:r>
+            <a:r>
+              <a:rPr lang="de-DE" baseline="0" dirty="0" smtClean="0"/>
+              <a:t> </a:t>
+            </a:r>
+            <a:r>
+              <a:rPr lang="de-DE" baseline="0" dirty="0" err="1" smtClean="0"/>
+              <a:t>closed</a:t>
+            </a:r>
+            <a:r>
+              <a:rPr lang="de-DE" baseline="0" dirty="0" smtClean="0"/>
+              <a:t> </a:t>
+            </a:r>
+            <a:r>
+              <a:rPr lang="de-DE" baseline="0" dirty="0" err="1" smtClean="0"/>
+              <a:t>set</a:t>
+            </a:r>
+            <a:r>
+              <a:rPr lang="de-DE" baseline="0" dirty="0" smtClean="0"/>
+              <a:t> </a:t>
+            </a:r>
+            <a:r>
+              <a:rPr lang="de-DE" baseline="0" dirty="0" err="1" smtClean="0"/>
+              <a:t>authentication</a:t>
+            </a:r>
+            <a:endParaRPr lang="de-DE" baseline="0" dirty="0" smtClean="0"/>
+          </a:p>
+          <a:p>
+            <a:r>
+              <a:rPr lang="de-DE" baseline="0" dirty="0" err="1" smtClean="0"/>
+              <a:t>And</a:t>
+            </a:r>
+            <a:r>
+              <a:rPr lang="de-DE" baseline="0" dirty="0" smtClean="0"/>
+              <a:t> </a:t>
+            </a:r>
+            <a:r>
+              <a:rPr lang="de-DE" baseline="0" dirty="0" err="1" smtClean="0"/>
+              <a:t>how</a:t>
+            </a:r>
+            <a:r>
+              <a:rPr lang="de-DE" baseline="0" dirty="0" smtClean="0"/>
+              <a:t> </a:t>
+            </a:r>
+            <a:r>
+              <a:rPr lang="de-DE" baseline="0" dirty="0" err="1" smtClean="0"/>
+              <a:t>does</a:t>
+            </a:r>
+            <a:r>
+              <a:rPr lang="de-DE" baseline="0" dirty="0" smtClean="0"/>
+              <a:t> </a:t>
+            </a:r>
+            <a:r>
+              <a:rPr lang="de-DE" baseline="0" dirty="0" err="1" smtClean="0"/>
+              <a:t>this</a:t>
+            </a:r>
+            <a:r>
+              <a:rPr lang="de-DE" baseline="0" dirty="0" smtClean="0"/>
+              <a:t> </a:t>
+            </a:r>
+            <a:r>
+              <a:rPr lang="de-DE" baseline="0" dirty="0" err="1" smtClean="0"/>
+              <a:t>affect</a:t>
+            </a:r>
+            <a:r>
+              <a:rPr lang="de-DE" baseline="0" dirty="0" smtClean="0"/>
+              <a:t> </a:t>
+            </a:r>
+            <a:r>
+              <a:rPr lang="de-DE" baseline="0" dirty="0" err="1" smtClean="0"/>
+              <a:t>our</a:t>
+            </a:r>
+            <a:r>
+              <a:rPr lang="de-DE" baseline="0" dirty="0" smtClean="0"/>
+              <a:t> </a:t>
+            </a:r>
+            <a:r>
+              <a:rPr lang="de-DE" baseline="0" dirty="0" err="1" smtClean="0"/>
+              <a:t>work</a:t>
+            </a:r>
+            <a:endParaRPr lang="de-DE" baseline="0" dirty="0" smtClean="0"/>
+          </a:p>
+          <a:p>
+            <a:r>
+              <a:rPr lang="de-DE" baseline="0" dirty="0" smtClean="0"/>
+              <a:t>…</a:t>
+            </a:r>
+            <a:r>
+              <a:rPr lang="de-DE" baseline="0" dirty="0" err="1" smtClean="0"/>
+              <a:t>slides</a:t>
+            </a:r>
+            <a:r>
+              <a:rPr lang="de-DE" baseline="0" dirty="0" smtClean="0"/>
+              <a:t>…</a:t>
+            </a:r>
+          </a:p>
+          <a:p>
+            <a:endParaRPr lang="de-DE" baseline="0" dirty="0" smtClean="0"/>
+          </a:p>
+          <a:p>
+            <a:endParaRPr lang="de-DE" baseline="0" dirty="0" smtClean="0"/>
+          </a:p>
+          <a:p>
+            <a:r>
+              <a:rPr lang="de-DE" baseline="0" dirty="0" err="1" smtClean="0"/>
+              <a:t>Result</a:t>
+            </a:r>
+            <a:r>
+              <a:rPr lang="de-DE" baseline="0" dirty="0" smtClean="0"/>
+              <a:t>: </a:t>
+            </a:r>
+            <a:r>
+              <a:rPr lang="de-DE" baseline="0" dirty="0" err="1" smtClean="0"/>
+              <a:t>no</a:t>
+            </a:r>
+            <a:r>
+              <a:rPr lang="de-DE" baseline="0" dirty="0" smtClean="0"/>
+              <a:t> </a:t>
+            </a:r>
+            <a:r>
+              <a:rPr lang="de-DE" baseline="0" dirty="0" err="1" smtClean="0"/>
+              <a:t>significant</a:t>
+            </a:r>
+            <a:r>
+              <a:rPr lang="de-DE" baseline="0" dirty="0" smtClean="0"/>
+              <a:t> </a:t>
+            </a:r>
+            <a:r>
+              <a:rPr lang="de-DE" baseline="0" dirty="0" err="1" smtClean="0"/>
+              <a:t>difference</a:t>
+            </a:r>
+            <a:r>
+              <a:rPr lang="de-DE" baseline="0" dirty="0" smtClean="0"/>
+              <a:t> </a:t>
+            </a:r>
+            <a:r>
+              <a:rPr lang="de-DE" baseline="0" dirty="0" err="1" smtClean="0"/>
+              <a:t>between</a:t>
+            </a:r>
+            <a:r>
+              <a:rPr lang="de-DE" baseline="0" dirty="0" smtClean="0"/>
+              <a:t> </a:t>
+            </a:r>
+            <a:r>
+              <a:rPr lang="de-DE" baseline="0" dirty="0" err="1" smtClean="0"/>
+              <a:t>the</a:t>
+            </a:r>
+            <a:r>
+              <a:rPr lang="de-DE" baseline="0" dirty="0" smtClean="0"/>
+              <a:t> male/</a:t>
+            </a:r>
+            <a:r>
+              <a:rPr lang="de-DE" baseline="0" dirty="0" err="1" smtClean="0"/>
+              <a:t>female</a:t>
+            </a:r>
+            <a:r>
+              <a:rPr lang="de-DE" baseline="0" dirty="0" smtClean="0"/>
+              <a:t> </a:t>
+            </a:r>
+            <a:r>
+              <a:rPr lang="de-DE" baseline="0" dirty="0" err="1" smtClean="0"/>
+              <a:t>set</a:t>
+            </a:r>
+            <a:endParaRPr lang="de-DE" baseline="0" dirty="0" smtClean="0"/>
           </a:p>
         </p:txBody>
       </p:sp>
@@ -6642,7 +7126,7 @@
               <a:pPr>
                 <a:defRPr/>
               </a:pPr>
-              <a:t>12.01.2015</a:t>
+              <a:t>14.01.2015</a:t>
             </a:fld>
             <a:endParaRPr lang="de-DE" dirty="0"/>
           </a:p>
@@ -6671,7 +7155,7 @@
               <a:pPr>
                 <a:defRPr/>
               </a:pPr>
-              <a:t>11</a:t>
+              <a:t>10</a:t>
             </a:fld>
             <a:endParaRPr lang="de-DE" dirty="0"/>
           </a:p>
@@ -6680,7 +7164,7 @@
     </p:spTree>
     <p:extLst>
       <p:ext uri="{BB962C8B-B14F-4D97-AF65-F5344CB8AC3E}">
-        <p14:creationId xmlns:p14="http://schemas.microsoft.com/office/powerpoint/2010/main" val="4078180298"/>
+        <p14:creationId xmlns:p14="http://schemas.microsoft.com/office/powerpoint/2010/main" val="1217578304"/>
       </p:ext>
     </p:extLst>
   </p:cSld>
@@ -6722,7 +7206,6 @@
       </p:par>
     </p:tnLst>
   </p:timing>
-  <p:hf sldNum="0" hdr="0" ftr="0" dt="0"/>
 </p:sldLayout>
 </file>
 
@@ -6952,9 +7435,14 @@
   <p:clrMapOvr>
     <a:masterClrMapping/>
   </p:clrMapOvr>
-  <p:transition spd="slow" advClick="0" advTm="4000">
-    <p:fade/>
-  </p:transition>
+  <mc:AlternateContent xmlns:mc="http://schemas.openxmlformats.org/markup-compatibility/2006">
+    <mc:Choice xmlns:p14="http://schemas.microsoft.com/office/powerpoint/2010/main" Requires="p14">
+      <p:transition p14:dur="10" advClick="0" advTm="4000"/>
+    </mc:Choice>
+    <mc:Fallback>
+      <p:transition advClick="0" advTm="4000"/>
+    </mc:Fallback>
+  </mc:AlternateContent>
   <p:timing>
     <p:tnLst>
       <p:par>
@@ -9299,6 +9787,7 @@
       </p:par>
     </p:tnLst>
   </p:timing>
+  <p:hf sldNum="0" hdr="0" ftr="0" dt="0"/>
   <p:txStyles>
     <p:titleStyle>
       <a:lvl1pPr algn="l" defTabSz="838200" rtl="0" eaLnBrk="1" fontAlgn="base" hangingPunct="1">
@@ -10122,9 +10611,14 @@
   <p:clrMapOvr>
     <a:masterClrMapping/>
   </p:clrMapOvr>
-  <p:transition spd="slow" advClick="0" advTm="4000">
-    <p:fade/>
-  </p:transition>
+  <mc:AlternateContent xmlns:mc="http://schemas.openxmlformats.org/markup-compatibility/2006" xmlns:p14="http://schemas.microsoft.com/office/powerpoint/2010/main">
+    <mc:Choice Requires="p14">
+      <p:transition p14:dur="0" advClick="0" advTm="4000"/>
+    </mc:Choice>
+    <mc:Fallback xmlns="">
+      <p:transition advClick="0" advTm="4000"/>
+    </mc:Fallback>
+  </mc:AlternateContent>
   <p:timing>
     <p:tnLst>
       <p:par>
@@ -10167,49 +10661,128 @@
           <a:bodyPr/>
           <a:lstStyle/>
           <a:p>
-            <a:r>
-              <a:rPr lang="en-US" dirty="0" err="1" smtClean="0"/>
-              <a:t>Unterschied</a:t>
+            <a:pPr marL="350520" indent="0">
+              <a:buNone/>
+            </a:pPr>
+            <a:endParaRPr lang="en-US" dirty="0" smtClean="0"/>
+          </a:p>
+          <a:p>
+            <a:pPr marL="350520" indent="0">
+              <a:buNone/>
+            </a:pPr>
+            <a:endParaRPr lang="en-US" dirty="0" smtClean="0"/>
+          </a:p>
+          <a:p>
+            <a:pPr marL="350520" indent="0">
+              <a:buNone/>
+            </a:pPr>
+            <a:r>
+              <a:rPr lang="en-US" b="1" dirty="0" smtClean="0"/>
+              <a:t>Task</a:t>
             </a:r>
             <a:r>
               <a:rPr lang="en-US" dirty="0" smtClean="0"/>
-              <a:t> samples recordings</a:t>
-            </a:r>
-          </a:p>
-          <a:p>
-            <a:endParaRPr lang="en-US" dirty="0"/>
-          </a:p>
-          <a:p>
+              <a:t>: closed</a:t>
+            </a:r>
             <a:r>
               <a:rPr lang="en-US" dirty="0" smtClean="0"/>
-              <a:t>Speaker </a:t>
-            </a:r>
+              <a:t> speaker recognition</a:t>
+            </a:r>
+          </a:p>
+          <a:p>
+            <a:pPr marL="350520" indent="0">
+              <a:buNone/>
+            </a:pPr>
+            <a:r>
+              <a:rPr lang="en-US" dirty="0" smtClean="0"/>
+              <a:t>	- no rejection scheme</a:t>
+            </a:r>
+          </a:p>
+          <a:p>
+            <a:pPr marL="350520" indent="0">
+              <a:buNone/>
+            </a:pPr>
+            <a:r>
+              <a:rPr lang="en-US" dirty="0" smtClean="0"/>
+              <a:t>	- no acceptance threshold</a:t>
+            </a:r>
+          </a:p>
+          <a:p>
+            <a:pPr marL="350520" indent="0">
+              <a:buNone/>
+            </a:pPr>
+            <a:r>
+              <a:rPr lang="en-US" smtClean="0"/>
+              <a:t>	</a:t>
+            </a:r>
+            <a:endParaRPr lang="en-US" dirty="0" smtClean="0"/>
+          </a:p>
+          <a:p>
+            <a:pPr marL="350520" indent="0">
+              <a:buNone/>
+            </a:pPr>
+            <a:r>
+              <a:rPr lang="en-US" b="1" dirty="0" smtClean="0"/>
+              <a:t>Only need</a:t>
+            </a:r>
+            <a:r>
+              <a:rPr lang="en-US" dirty="0" smtClean="0"/>
+              <a:t>:</a:t>
+            </a:r>
+          </a:p>
+          <a:p>
+            <a:pPr marL="350520" indent="0">
+              <a:buNone/>
+            </a:pPr>
             <a:r>
               <a:rPr lang="en-US" dirty="0"/>
-              <a:t>is correct classified, if the majority of samples of one recording is correct </a:t>
+              <a:t>	</a:t>
             </a:r>
             <a:r>
               <a:rPr lang="en-US" dirty="0" smtClean="0"/>
-              <a:t>classified</a:t>
-            </a:r>
-            <a:endParaRPr lang="de-DE" dirty="0" smtClean="0"/>
-          </a:p>
-          <a:p>
-            <a:endParaRPr lang="de-DE" dirty="0" smtClean="0"/>
-          </a:p>
-          <a:p>
-            <a:r>
-              <a:rPr lang="de-DE" dirty="0" smtClean="0"/>
-              <a:t>Tabelle vergleich </a:t>
-            </a:r>
-            <a:r>
-              <a:rPr lang="de-DE" dirty="0" err="1" smtClean="0"/>
-              <a:t>Hyke</a:t>
-            </a:r>
-            <a:r>
-              <a:rPr lang="de-DE" dirty="0" smtClean="0"/>
-              <a:t> vs. unser Ergebnis</a:t>
-            </a:r>
+              <a:t>- closest match, witch means the majority of samples</a:t>
+            </a:r>
+          </a:p>
+          <a:p>
+            <a:pPr marL="350520" indent="0">
+              <a:buNone/>
+            </a:pPr>
+            <a:endParaRPr lang="en-US" dirty="0" smtClean="0"/>
+          </a:p>
+          <a:p>
+            <a:pPr marL="350520" indent="0">
+              <a:buNone/>
+            </a:pPr>
+            <a:r>
+              <a:rPr lang="en-US" b="1" dirty="0" smtClean="0"/>
+              <a:t>Result</a:t>
+            </a:r>
+            <a:r>
+              <a:rPr lang="en-US" dirty="0" smtClean="0"/>
+              <a:t>: </a:t>
+            </a:r>
+          </a:p>
+          <a:p>
+            <a:pPr marL="350520" indent="0">
+              <a:buNone/>
+            </a:pPr>
+            <a:r>
+              <a:rPr lang="en-US" dirty="0"/>
+              <a:t>	</a:t>
+            </a:r>
+            <a:r>
+              <a:rPr lang="en-US" dirty="0" smtClean="0"/>
+              <a:t>- 96,68 % </a:t>
+            </a:r>
+            <a:r>
+              <a:rPr lang="en-US" dirty="0"/>
+              <a:t>correctly  </a:t>
+            </a:r>
+            <a:r>
+              <a:rPr lang="en-US" dirty="0" smtClean="0"/>
+              <a:t>authenticated</a:t>
+            </a:r>
+            <a:endParaRPr lang="en-US" dirty="0" smtClean="0"/>
           </a:p>
         </p:txBody>
       </p:sp>
@@ -10229,26 +10802,10 @@
           <a:lstStyle/>
           <a:p>
             <a:r>
-              <a:rPr lang="de-DE" dirty="0" err="1" smtClean="0"/>
-              <a:t>Result</a:t>
-            </a:r>
-            <a:r>
-              <a:rPr lang="de-DE" dirty="0"/>
-              <a:t> </a:t>
-            </a:r>
-            <a:r>
-              <a:rPr lang="de-DE" dirty="0" err="1" smtClean="0"/>
-              <a:t>of</a:t>
-            </a:r>
-            <a:r>
-              <a:rPr lang="de-DE" dirty="0" smtClean="0"/>
-              <a:t> </a:t>
-            </a:r>
-            <a:r>
-              <a:rPr lang="de-DE" dirty="0" err="1" smtClean="0"/>
-              <a:t>classification</a:t>
-            </a:r>
-            <a:endParaRPr lang="de-DE" dirty="0"/>
+              <a:rPr lang="en-US" dirty="0" smtClean="0"/>
+              <a:t>Result of classification</a:t>
+            </a:r>
+            <a:endParaRPr lang="en-US" dirty="0"/>
           </a:p>
         </p:txBody>
       </p:sp>
@@ -10260,7 +10817,7 @@
         </p:nvSpPr>
         <p:spPr>
           <a:xfrm>
-            <a:off x="-9361" y="5373216"/>
+            <a:off x="467544" y="4957716"/>
             <a:ext cx="8274438" cy="830997"/>
           </a:xfrm>
           <a:prstGeom prst="rect">
@@ -10300,9 +10857,21 @@
   <p:clrMapOvr>
     <a:masterClrMapping/>
   </p:clrMapOvr>
-  <p:transition spd="slow" advClick="0" advTm="4000">
-    <p:fade/>
-  </p:transition>
+  <mc:AlternateContent xmlns:mc="http://schemas.openxmlformats.org/markup-compatibility/2006">
+    <mc:Choice xmlns:p14="http://schemas.microsoft.com/office/powerpoint/2010/main" Requires="p14">
+      <p:transition p14:dur="10" advClick="0" advTm="4000"/>
+    </mc:Choice>
+    <mc:Fallback>
+      <p:transition advClick="0" advTm="4000"/>
+    </mc:Fallback>
+  </mc:AlternateContent>
+  <p:timing>
+    <p:tnLst>
+      <p:par>
+        <p:cTn id="1" dur="indefinite" restart="never" nodeType="tmRoot"/>
+      </p:par>
+    </p:tnLst>
+  </p:timing>
 </p:sld>
 </file>
 
@@ -10401,9 +10970,14 @@
   <p:clrMapOvr>
     <a:masterClrMapping/>
   </p:clrMapOvr>
-  <p:transition spd="slow" advClick="0" advTm="4000">
-    <p:fade/>
-  </p:transition>
+  <mc:AlternateContent xmlns:mc="http://schemas.openxmlformats.org/markup-compatibility/2006">
+    <mc:Choice xmlns:p14="http://schemas.microsoft.com/office/powerpoint/2010/main" Requires="p14">
+      <p:transition p14:dur="10" advClick="0" advTm="4000"/>
+    </mc:Choice>
+    <mc:Fallback>
+      <p:transition advClick="0" advTm="4000"/>
+    </mc:Fallback>
+  </mc:AlternateContent>
   <p:timing>
     <p:tnLst>
       <p:par>
@@ -10564,7 +11138,7 @@
           <p:nvPr>
             <p:extLst>
               <p:ext uri="{D42A27DB-BD31-4B8C-83A1-F6EECF244321}">
-                <p14:modId xmlns:p14="http://schemas.microsoft.com/office/powerpoint/2010/main" val="1656331796"/>
+                <p14:modId xmlns:p14="http://schemas.microsoft.com/office/powerpoint/2010/main" val="3527389672"/>
               </p:ext>
             </p:extLst>
           </p:nvPr>
@@ -10635,7 +11209,7 @@
                     <a:p>
                       <a:r>
                         <a:rPr lang="de-DE" dirty="0" smtClean="0"/>
-                        <a:t>90%</a:t>
+                        <a:t>93,36%</a:t>
                       </a:r>
                       <a:endParaRPr lang="de-DE" dirty="0"/>
                     </a:p>
@@ -10665,7 +11239,7 @@
                     <a:p>
                       <a:r>
                         <a:rPr lang="de-DE" dirty="0" smtClean="0"/>
-                        <a:t>5%</a:t>
+                        <a:t>3,32%</a:t>
                       </a:r>
                       <a:endParaRPr lang="de-DE" dirty="0"/>
                     </a:p>
@@ -10695,7 +11269,7 @@
                     <a:p>
                       <a:r>
                         <a:rPr lang="de-DE" dirty="0" smtClean="0"/>
-                        <a:t>2,5%</a:t>
+                        <a:t>1,66%</a:t>
                       </a:r>
                       <a:endParaRPr lang="de-DE" dirty="0"/>
                     </a:p>
@@ -10725,7 +11299,7 @@
                     <a:p>
                       <a:r>
                         <a:rPr lang="de-DE" dirty="0" smtClean="0"/>
-                        <a:t>2,5%</a:t>
+                        <a:t>1,66%</a:t>
                       </a:r>
                       <a:endParaRPr lang="de-DE" dirty="0"/>
                     </a:p>
@@ -10747,9 +11321,14 @@
   <p:clrMapOvr>
     <a:masterClrMapping/>
   </p:clrMapOvr>
-  <p:transition spd="slow" advClick="0" advTm="4000">
-    <p:fade/>
-  </p:transition>
+  <mc:AlternateContent xmlns:mc="http://schemas.openxmlformats.org/markup-compatibility/2006">
+    <mc:Choice xmlns:p14="http://schemas.microsoft.com/office/powerpoint/2010/main" Requires="p14">
+      <p:transition p14:dur="10" advClick="0" advTm="4000"/>
+    </mc:Choice>
+    <mc:Fallback>
+      <p:transition advClick="0" advTm="4000"/>
+    </mc:Fallback>
+  </mc:AlternateContent>
   <p:timing>
     <p:tnLst>
       <p:par>
@@ -10862,8 +11441,39 @@
           <a:p>
             <a:r>
               <a:rPr lang="en-US" sz="2400" dirty="0" smtClean="0"/>
-              <a:t>97,5% authentication rate</a:t>
-            </a:r>
+              <a:t>96,68% </a:t>
+            </a:r>
+            <a:r>
+              <a:rPr lang="en-US" sz="2400" dirty="0" smtClean="0"/>
+              <a:t>authentication </a:t>
+            </a:r>
+            <a:r>
+              <a:rPr lang="en-US" sz="2400" dirty="0" smtClean="0"/>
+              <a:t>rate</a:t>
+            </a:r>
+          </a:p>
+          <a:p>
+            <a:r>
+              <a:rPr lang="en-US" sz="2400" dirty="0" smtClean="0"/>
+              <a:t>Successfully projection of </a:t>
+            </a:r>
+            <a:r>
+              <a:rPr lang="en-US" sz="2400" dirty="0"/>
+              <a:t>‘</a:t>
+            </a:r>
+            <a:r>
+              <a:rPr lang="en-US" sz="2400" dirty="0" err="1"/>
+              <a:t>Doddingtons</a:t>
+            </a:r>
+            <a:r>
+              <a:rPr lang="en-US" sz="2400" dirty="0"/>
+              <a:t> Zoo</a:t>
+            </a:r>
+            <a:r>
+              <a:rPr lang="en-US" sz="2400" dirty="0" smtClean="0"/>
+              <a:t>’</a:t>
+            </a:r>
+            <a:endParaRPr lang="en-US" sz="2400" dirty="0" smtClean="0"/>
           </a:p>
           <a:p>
             <a:endParaRPr lang="de-DE" sz="2400" dirty="0" smtClean="0"/>
@@ -10910,9 +11520,14 @@
   <p:clrMapOvr>
     <a:masterClrMapping/>
   </p:clrMapOvr>
-  <p:transition spd="slow" advClick="0" advTm="4000">
-    <p:fade/>
-  </p:transition>
+  <mc:AlternateContent xmlns:mc="http://schemas.openxmlformats.org/markup-compatibility/2006">
+    <mc:Choice xmlns:p14="http://schemas.microsoft.com/office/powerpoint/2010/main" Requires="p14">
+      <p:transition p14:dur="10" advClick="0" advTm="4000"/>
+    </mc:Choice>
+    <mc:Fallback>
+      <p:transition advClick="0" advTm="4000"/>
+    </mc:Fallback>
+  </mc:AlternateContent>
   <p:timing>
     <p:tnLst>
       <p:par>
@@ -11458,20 +12073,28 @@
             <a:pPr marL="350520" indent="0">
               <a:buNone/>
             </a:pPr>
-            <a:endParaRPr lang="en-US" sz="2000" dirty="0"/>
+            <a:endParaRPr lang="en-US" sz="2000" dirty="0" smtClean="0"/>
           </a:p>
           <a:p>
             <a:pPr marL="350520" indent="0">
               <a:buNone/>
             </a:pPr>
+            <a:endParaRPr lang="en-US" sz="2000" dirty="0"/>
+          </a:p>
+          <a:p>
+            <a:pPr marL="350520" indent="0">
+              <a:buNone/>
+            </a:pPr>
             <a:r>
               <a:rPr lang="en-US" sz="2000" dirty="0" smtClean="0"/>
-              <a:t>Our task </a:t>
-            </a:r>
-            <a:r>
-              <a:rPr lang="en-US" sz="2000" dirty="0" smtClean="0"/>
-              <a:t>was:</a:t>
-            </a:r>
+              <a:t>Our task was:</a:t>
+            </a:r>
+          </a:p>
+          <a:p>
+            <a:pPr marL="350520" indent="0">
+              <a:buNone/>
+            </a:pPr>
+            <a:endParaRPr lang="en-US" sz="2000" dirty="0" smtClean="0"/>
           </a:p>
           <a:p>
             <a:r>
@@ -11496,6 +12119,9 @@
             </a:r>
           </a:p>
           <a:p>
+            <a:endParaRPr lang="en-US" sz="2000" dirty="0" smtClean="0"/>
+          </a:p>
+          <a:p>
             <a:r>
               <a:rPr lang="en-US" sz="2000" dirty="0" smtClean="0"/>
               <a:t>Compare </a:t>
@@ -11526,6 +12152,9 @@
             </a:r>
           </a:p>
           <a:p>
+            <a:endParaRPr lang="en-US" sz="2000" dirty="0" smtClean="0"/>
+          </a:p>
+          <a:p>
             <a:r>
               <a:rPr lang="en-US" sz="2000" dirty="0" smtClean="0"/>
               <a:t>A </a:t>
@@ -11546,7 +12175,6 @@
               <a:rPr lang="en-US" sz="2000" dirty="0" smtClean="0"/>
               <a:t>’ [Doddington1998]</a:t>
             </a:r>
-            <a:endParaRPr lang="en-US" sz="2000" dirty="0" smtClean="0"/>
           </a:p>
         </p:txBody>
       </p:sp>
@@ -11583,9 +12211,14 @@
   <p:clrMapOvr>
     <a:masterClrMapping/>
   </p:clrMapOvr>
-  <p:transition spd="slow" advClick="0" advTm="4000">
-    <p:fade/>
-  </p:transition>
+  <mc:AlternateContent xmlns:mc="http://schemas.openxmlformats.org/markup-compatibility/2006">
+    <mc:Choice xmlns:p14="http://schemas.microsoft.com/office/powerpoint/2010/main" Requires="p14">
+      <p:transition p14:dur="10" advClick="0" advTm="4000"/>
+    </mc:Choice>
+    <mc:Fallback>
+      <p:transition advClick="0" advTm="4000"/>
+    </mc:Fallback>
+  </mc:AlternateContent>
   <p:timing>
     <p:tnLst>
       <p:par>
@@ -11623,38 +12256,114 @@
             <p:ph type="body" sz="quarter" idx="10"/>
           </p:nvPr>
         </p:nvSpPr>
-        <p:spPr/>
+        <p:spPr>
+          <a:xfrm>
+            <a:off x="2" y="1143000"/>
+            <a:ext cx="8537574" cy="4662264"/>
+          </a:xfrm>
+        </p:spPr>
         <p:txBody>
           <a:bodyPr/>
           <a:lstStyle/>
           <a:p>
-            <a:r>
-              <a:rPr lang="de-DE" dirty="0" smtClean="0"/>
-              <a:t>Von wem?</a:t>
-            </a:r>
-          </a:p>
-          <a:p>
-            <a:r>
-              <a:rPr lang="de-DE" dirty="0" smtClean="0"/>
-              <a:t>Wo?</a:t>
-            </a:r>
-          </a:p>
-          <a:p>
-            <a:r>
-              <a:rPr lang="de-DE" dirty="0" smtClean="0"/>
-              <a:t>Ziel</a:t>
-            </a:r>
-          </a:p>
-          <a:p>
-            <a:r>
-              <a:rPr lang="de-DE" dirty="0" smtClean="0"/>
-              <a:t>Was wurde dafür getan?</a:t>
-            </a:r>
-          </a:p>
-          <a:p>
-            <a:r>
-              <a:rPr lang="de-DE" dirty="0" smtClean="0"/>
-              <a:t>Was hat das mit uns zu tun?</a:t>
+            <a:endParaRPr lang="en-US" dirty="0" smtClean="0"/>
+          </a:p>
+          <a:p>
+            <a:r>
+              <a:rPr lang="en-US" dirty="0" smtClean="0"/>
+              <a:t>Attendance tracking </a:t>
+            </a:r>
+          </a:p>
+          <a:p>
+            <a:pPr marL="350520" indent="0">
+              <a:buNone/>
+            </a:pPr>
+            <a:r>
+              <a:rPr lang="en-US" dirty="0"/>
+              <a:t>	</a:t>
+            </a:r>
+            <a:r>
+              <a:rPr lang="en-US" dirty="0" smtClean="0"/>
+              <a:t>- </a:t>
+            </a:r>
+            <a:r>
+              <a:rPr lang="en-US" dirty="0" smtClean="0"/>
+              <a:t>without trusted administrator on-side</a:t>
+            </a:r>
+          </a:p>
+          <a:p>
+            <a:endParaRPr lang="en-US" dirty="0" smtClean="0"/>
+          </a:p>
+          <a:p>
+            <a:r>
+              <a:rPr lang="en-US" dirty="0" smtClean="0"/>
+              <a:t>Teacher in northwestern Indian</a:t>
+            </a:r>
+          </a:p>
+          <a:p>
+            <a:endParaRPr lang="en-US" dirty="0" smtClean="0"/>
+          </a:p>
+          <a:p>
+            <a:r>
+              <a:rPr lang="en-US" dirty="0" smtClean="0"/>
+              <a:t>In past: </a:t>
+            </a:r>
+          </a:p>
+          <a:p>
+            <a:pPr marL="350520" lvl="1" indent="0">
+              <a:buNone/>
+            </a:pPr>
+            <a:r>
+              <a:rPr lang="en-US" dirty="0" smtClean="0"/>
+              <a:t>	- camera based</a:t>
+            </a:r>
+          </a:p>
+          <a:p>
+            <a:pPr marL="350520" lvl="1" indent="0">
+              <a:buNone/>
+            </a:pPr>
+            <a:r>
+              <a:rPr lang="en-US" dirty="0" smtClean="0"/>
+              <a:t>	- two photos per day (with timestamp)</a:t>
+            </a:r>
+          </a:p>
+          <a:p>
+            <a:pPr marL="350520" lvl="1" indent="0">
+              <a:buNone/>
+            </a:pPr>
+            <a:r>
+              <a:rPr lang="en-US" dirty="0" smtClean="0"/>
+              <a:t>	- physically verified</a:t>
+            </a:r>
+          </a:p>
+          <a:p>
+            <a:pPr marL="350520" lvl="1" indent="0">
+              <a:buNone/>
+            </a:pPr>
+            <a:endParaRPr lang="de-DE" dirty="0" smtClean="0"/>
+          </a:p>
+          <a:p>
+            <a:r>
+              <a:rPr lang="en-US" dirty="0" smtClean="0"/>
+              <a:t>Advantages of speaker recognition:</a:t>
+            </a:r>
+          </a:p>
+          <a:p>
+            <a:pPr marL="350520" indent="0">
+              <a:buNone/>
+            </a:pPr>
+            <a:r>
+              <a:rPr lang="en-US" dirty="0" smtClean="0"/>
+              <a:t>	- cheap device</a:t>
+            </a:r>
+          </a:p>
+          <a:p>
+            <a:pPr marL="350520" indent="0">
+              <a:buNone/>
+            </a:pPr>
+            <a:r>
+              <a:rPr lang="en-US" dirty="0" smtClean="0"/>
+              <a:t>	- no need of internet</a:t>
             </a:r>
           </a:p>
         </p:txBody>
@@ -11696,9 +12405,14 @@
   <p:clrMapOvr>
     <a:masterClrMapping/>
   </p:clrMapOvr>
-  <p:transition spd="slow" advClick="0" advTm="4000">
-    <p:fade/>
-  </p:transition>
+  <mc:AlternateContent xmlns:mc="http://schemas.openxmlformats.org/markup-compatibility/2006">
+    <mc:Choice xmlns:p14="http://schemas.microsoft.com/office/powerpoint/2010/main" Requires="p14">
+      <p:transition p14:dur="10" advClick="0" advTm="4000"/>
+    </mc:Choice>
+    <mc:Fallback>
+      <p:transition advClick="0" advTm="4000"/>
+    </mc:Fallback>
+  </mc:AlternateContent>
   <p:timing>
     <p:tnLst>
       <p:par>
@@ -11781,9 +12495,14 @@
   <p:clrMapOvr>
     <a:masterClrMapping/>
   </p:clrMapOvr>
-  <p:transition spd="slow" advClick="0" advTm="4000">
-    <p:fade/>
-  </p:transition>
+  <mc:AlternateContent xmlns:mc="http://schemas.openxmlformats.org/markup-compatibility/2006">
+    <mc:Choice xmlns:p14="http://schemas.microsoft.com/office/powerpoint/2010/main" Requires="p14">
+      <p:transition p14:dur="10" advClick="0" advTm="4000"/>
+    </mc:Choice>
+    <mc:Fallback>
+      <p:transition advClick="0" advTm="4000"/>
+    </mc:Fallback>
+  </mc:AlternateContent>
   <p:timing>
     <p:tnLst>
       <p:par>
@@ -11840,7 +12559,6 @@
               <a:rPr lang="en-US" sz="2000" dirty="0" smtClean="0"/>
               <a:t>83:</a:t>
             </a:r>
-            <a:endParaRPr lang="en-US" sz="2000" dirty="0" smtClean="0"/>
           </a:p>
           <a:p>
             <a:pPr marL="350520" lvl="4" indent="0">
@@ -11862,11 +12580,7 @@
             </a:r>
             <a:r>
               <a:rPr lang="en-US" sz="2000" dirty="0" smtClean="0"/>
-              <a:t>- Female: </a:t>
-            </a:r>
-            <a:r>
-              <a:rPr lang="en-US" sz="2000" dirty="0" smtClean="0"/>
-              <a:t>35</a:t>
+              <a:t>- Female: 35</a:t>
             </a:r>
           </a:p>
           <a:p>
@@ -11892,11 +12606,7 @@
             </a:r>
             <a:r>
               <a:rPr lang="en-US" sz="2000" dirty="0" smtClean="0"/>
-              <a:t>recordings of each </a:t>
-            </a:r>
-            <a:r>
-              <a:rPr lang="en-US" sz="2000" dirty="0" smtClean="0"/>
-              <a:t>speaker</a:t>
+              <a:t>recordings of each speaker</a:t>
             </a:r>
           </a:p>
           <a:p>
@@ -11927,19 +12637,7 @@
             </a:r>
             <a:r>
               <a:rPr lang="en-US" sz="2000" dirty="0" smtClean="0"/>
-              <a:t>- </a:t>
-            </a:r>
-            <a:r>
-              <a:rPr lang="en-US" sz="2000" dirty="0" smtClean="0"/>
-              <a:t>length </a:t>
-            </a:r>
-            <a:r>
-              <a:rPr lang="en-US" sz="2000" dirty="0" smtClean="0"/>
-              <a:t>between 5 and 35 </a:t>
-            </a:r>
-            <a:r>
-              <a:rPr lang="en-US" sz="2000" dirty="0" smtClean="0"/>
-              <a:t>seconds</a:t>
+              <a:t>- length between 5 and 35 seconds</a:t>
             </a:r>
           </a:p>
           <a:p>
@@ -11952,11 +12650,7 @@
             </a:r>
             <a:r>
               <a:rPr lang="en-US" sz="2000" dirty="0" smtClean="0"/>
-              <a:t>- overall Size </a:t>
-            </a:r>
-            <a:r>
-              <a:rPr lang="en-US" sz="2000" dirty="0" smtClean="0"/>
-              <a:t>100mb</a:t>
+              <a:t>- overall Size 100mb</a:t>
             </a:r>
             <a:endParaRPr lang="en-US" sz="2000" dirty="0"/>
           </a:p>
@@ -11966,19 +12660,7 @@
             </a:pPr>
             <a:r>
               <a:rPr lang="en-US" sz="2000" dirty="0" smtClean="0"/>
-              <a:t>	</a:t>
-            </a:r>
-            <a:r>
-              <a:rPr lang="en-US" sz="2000" dirty="0" smtClean="0"/>
-              <a:t>- recorded </a:t>
-            </a:r>
-            <a:r>
-              <a:rPr lang="en-US" sz="2000" dirty="0" smtClean="0"/>
-              <a:t>with normal </a:t>
-            </a:r>
-            <a:r>
-              <a:rPr lang="en-US" sz="2000" dirty="0" smtClean="0"/>
-              <a:t>telephones</a:t>
+              <a:t>	- recorded with normal telephones</a:t>
             </a:r>
           </a:p>
           <a:p>
@@ -11993,7 +12675,6 @@
               <a:rPr lang="en-US" sz="2000" dirty="0" smtClean="0"/>
               <a:t>- natural environment</a:t>
             </a:r>
-            <a:endParaRPr lang="en-US" sz="2000" dirty="0" smtClean="0"/>
           </a:p>
           <a:p>
             <a:endParaRPr lang="en-US" sz="2000" dirty="0" smtClean="0"/>
@@ -12016,11 +12697,7 @@
             </a:pPr>
             <a:r>
               <a:rPr lang="en-US" sz="2000" dirty="0" smtClean="0"/>
-              <a:t>Source</a:t>
-            </a:r>
-            <a:r>
-              <a:rPr lang="en-US" sz="2000" dirty="0" smtClean="0"/>
-              <a:t>: </a:t>
+              <a:t>Source: </a:t>
             </a:r>
             <a:r>
               <a:rPr lang="en-US" sz="2000" dirty="0"/>
@@ -12115,9 +12792,14 @@
   <p:clrMapOvr>
     <a:masterClrMapping/>
   </p:clrMapOvr>
-  <p:transition spd="slow" advClick="0" advTm="4000">
-    <p:fade/>
-  </p:transition>
+  <mc:AlternateContent xmlns:mc="http://schemas.openxmlformats.org/markup-compatibility/2006">
+    <mc:Choice xmlns:p14="http://schemas.microsoft.com/office/powerpoint/2010/main" Requires="p14">
+      <p:transition p14:dur="10" advClick="0" advTm="4000"/>
+    </mc:Choice>
+    <mc:Fallback>
+      <p:transition advClick="0" advTm="4000"/>
+    </mc:Fallback>
+  </mc:AlternateContent>
   <p:timing>
     <p:tnLst>
       <p:par>
@@ -12461,7 +13143,6 @@
               <a:rPr lang="en-US" sz="2400" b="1" dirty="0" smtClean="0"/>
               <a:t>1. Step: </a:t>
             </a:r>
-            <a:endParaRPr lang="en-US" sz="2400" b="1" dirty="0" smtClean="0"/>
           </a:p>
           <a:p>
             <a:endParaRPr lang="en-US" sz="2000" dirty="0" smtClean="0"/>
@@ -12700,9 +13381,14 @@
   <p:clrMapOvr>
     <a:masterClrMapping/>
   </p:clrMapOvr>
-  <p:transition spd="slow" advClick="0" advTm="4000">
-    <p:fade/>
-  </p:transition>
+  <mc:AlternateContent xmlns:mc="http://schemas.openxmlformats.org/markup-compatibility/2006">
+    <mc:Choice xmlns:p14="http://schemas.microsoft.com/office/powerpoint/2010/main" Requires="p14">
+      <p:transition p14:dur="10" advClick="0" advTm="4000"/>
+    </mc:Choice>
+    <mc:Fallback>
+      <p:transition advClick="0" advTm="4000"/>
+    </mc:Fallback>
+  </mc:AlternateContent>
   <p:timing>
     <p:tnLst>
       <p:par>
@@ -13068,9 +13754,14 @@
   <p:clrMapOvr>
     <a:masterClrMapping/>
   </p:clrMapOvr>
-  <p:transition spd="slow" advClick="0" advTm="4000">
-    <p:fade/>
-  </p:transition>
+  <mc:AlternateContent xmlns:mc="http://schemas.openxmlformats.org/markup-compatibility/2006">
+    <mc:Choice xmlns:p14="http://schemas.microsoft.com/office/powerpoint/2010/main" Requires="p14">
+      <p:transition p14:dur="10" advClick="0" advTm="4000"/>
+    </mc:Choice>
+    <mc:Fallback>
+      <p:transition advClick="0" advTm="4000"/>
+    </mc:Fallback>
+  </mc:AlternateContent>
   <p:timing>
     <p:tnLst>
       <p:par>
@@ -13482,9 +14173,14 @@
   <p:clrMapOvr>
     <a:masterClrMapping/>
   </p:clrMapOvr>
-  <p:transition spd="slow" advClick="0" advTm="4000">
-    <p:fade/>
-  </p:transition>
+  <mc:AlternateContent xmlns:mc="http://schemas.openxmlformats.org/markup-compatibility/2006">
+    <mc:Choice xmlns:p14="http://schemas.microsoft.com/office/powerpoint/2010/main" Requires="p14">
+      <p:transition p14:dur="10" advClick="0" advTm="4000"/>
+    </mc:Choice>
+    <mc:Fallback>
+      <p:transition advClick="0" advTm="4000"/>
+    </mc:Fallback>
+  </mc:AlternateContent>
   <p:timing>
     <p:tnLst>
       <p:par>
@@ -14053,9 +14749,14 @@
   <p:clrMapOvr>
     <a:masterClrMapping/>
   </p:clrMapOvr>
-  <p:transition spd="slow" advClick="0" advTm="4000">
-    <p:fade/>
-  </p:transition>
+  <mc:AlternateContent xmlns:mc="http://schemas.openxmlformats.org/markup-compatibility/2006">
+    <mc:Choice xmlns:p14="http://schemas.microsoft.com/office/powerpoint/2010/main" Requires="p14">
+      <p:transition p14:dur="10" advClick="0" advTm="4000"/>
+    </mc:Choice>
+    <mc:Fallback>
+      <p:transition advClick="0" advTm="4000"/>
+    </mc:Fallback>
+  </mc:AlternateContent>
   <p:timing>
     <p:tnLst>
       <p:par>

</xml_diff>